<commit_message>
izracunavanje - 1 zadatak
</commit_message>
<xml_diff>
--- a/Python/Python-Osnovni-kurs/Izracunavanje/1-Osnovne aritmeticke operacije i primjena/Prezentacija.pptx
+++ b/Python/Python-Osnovni-kurs/Izracunavanje/1-Osnovne aritmeticke operacije i primjena/Prezentacija.pptx
@@ -214,7 +214,7 @@
           <a:p>
             <a:fld id="{37DC2007-1088-4600-B1BC-AE884B82A1B0}" type="datetimeFigureOut">
               <a:rPr lang="en-US" smtClean="0"/>
-              <a:t>4/15/2021</a:t>
+              <a:t>4/16/2021</a:t>
             </a:fld>
             <a:endParaRPr lang="en-US"/>
           </a:p>
@@ -924,7 +924,7 @@
           <a:p>
             <a:fld id="{EECE8CBC-D9E8-4B9C-9658-364F4F7C96BD}" type="datetimeFigureOut">
               <a:rPr lang="en-US" smtClean="0"/>
-              <a:t>4/15/2021</a:t>
+              <a:t>4/16/2021</a:t>
             </a:fld>
             <a:endParaRPr lang="en-US"/>
           </a:p>
@@ -1360,7 +1360,7 @@
           <a:p>
             <a:fld id="{EECE8CBC-D9E8-4B9C-9658-364F4F7C96BD}" type="datetimeFigureOut">
               <a:rPr lang="en-US" smtClean="0"/>
-              <a:t>4/15/2021</a:t>
+              <a:t>4/16/2021</a:t>
             </a:fld>
             <a:endParaRPr lang="en-US"/>
           </a:p>
@@ -1610,7 +1610,7 @@
           <a:p>
             <a:fld id="{EECE8CBC-D9E8-4B9C-9658-364F4F7C96BD}" type="datetimeFigureOut">
               <a:rPr lang="en-US" smtClean="0"/>
-              <a:t>4/15/2021</a:t>
+              <a:t>4/16/2021</a:t>
             </a:fld>
             <a:endParaRPr lang="en-US"/>
           </a:p>
@@ -1918,7 +1918,7 @@
           <a:p>
             <a:fld id="{EECE8CBC-D9E8-4B9C-9658-364F4F7C96BD}" type="datetimeFigureOut">
               <a:rPr lang="en-US" smtClean="0"/>
-              <a:t>4/15/2021</a:t>
+              <a:t>4/16/2021</a:t>
             </a:fld>
             <a:endParaRPr lang="en-US"/>
           </a:p>
@@ -2236,7 +2236,7 @@
           <a:p>
             <a:fld id="{EECE8CBC-D9E8-4B9C-9658-364F4F7C96BD}" type="datetimeFigureOut">
               <a:rPr lang="en-US" smtClean="0"/>
-              <a:t>4/15/2021</a:t>
+              <a:t>4/16/2021</a:t>
             </a:fld>
             <a:endParaRPr lang="en-US"/>
           </a:p>
@@ -2538,7 +2538,7 @@
           <a:p>
             <a:fld id="{EECE8CBC-D9E8-4B9C-9658-364F4F7C96BD}" type="datetimeFigureOut">
               <a:rPr lang="en-US" smtClean="0"/>
-              <a:t>4/15/2021</a:t>
+              <a:t>4/16/2021</a:t>
             </a:fld>
             <a:endParaRPr lang="en-US"/>
           </a:p>
@@ -2905,7 +2905,7 @@
           <a:p>
             <a:fld id="{EECE8CBC-D9E8-4B9C-9658-364F4F7C96BD}" type="datetimeFigureOut">
               <a:rPr lang="en-US" smtClean="0"/>
-              <a:t>4/15/2021</a:t>
+              <a:t>4/16/2021</a:t>
             </a:fld>
             <a:endParaRPr lang="en-US"/>
           </a:p>
@@ -3079,7 +3079,7 @@
           <a:p>
             <a:fld id="{EECE8CBC-D9E8-4B9C-9658-364F4F7C96BD}" type="datetimeFigureOut">
               <a:rPr lang="en-US" smtClean="0"/>
-              <a:t>4/15/2021</a:t>
+              <a:t>4/16/2021</a:t>
             </a:fld>
             <a:endParaRPr lang="en-US"/>
           </a:p>
@@ -3259,7 +3259,7 @@
           <a:p>
             <a:fld id="{EECE8CBC-D9E8-4B9C-9658-364F4F7C96BD}" type="datetimeFigureOut">
               <a:rPr lang="en-US" smtClean="0"/>
-              <a:t>4/15/2021</a:t>
+              <a:t>4/16/2021</a:t>
             </a:fld>
             <a:endParaRPr lang="en-US"/>
           </a:p>
@@ -3429,7 +3429,7 @@
           <a:p>
             <a:fld id="{EECE8CBC-D9E8-4B9C-9658-364F4F7C96BD}" type="datetimeFigureOut">
               <a:rPr lang="en-US" smtClean="0"/>
-              <a:t>4/15/2021</a:t>
+              <a:t>4/16/2021</a:t>
             </a:fld>
             <a:endParaRPr lang="en-US"/>
           </a:p>
@@ -3679,7 +3679,7 @@
           <a:p>
             <a:fld id="{EECE8CBC-D9E8-4B9C-9658-364F4F7C96BD}" type="datetimeFigureOut">
               <a:rPr lang="en-US" smtClean="0"/>
-              <a:t>4/15/2021</a:t>
+              <a:t>4/16/2021</a:t>
             </a:fld>
             <a:endParaRPr lang="en-US"/>
           </a:p>
@@ -3915,7 +3915,7 @@
           <a:p>
             <a:fld id="{EECE8CBC-D9E8-4B9C-9658-364F4F7C96BD}" type="datetimeFigureOut">
               <a:rPr lang="en-US" smtClean="0"/>
-              <a:t>4/15/2021</a:t>
+              <a:t>4/16/2021</a:t>
             </a:fld>
             <a:endParaRPr lang="en-US"/>
           </a:p>
@@ -4297,7 +4297,7 @@
           <a:p>
             <a:fld id="{EECE8CBC-D9E8-4B9C-9658-364F4F7C96BD}" type="datetimeFigureOut">
               <a:rPr lang="en-US" smtClean="0"/>
-              <a:t>4/15/2021</a:t>
+              <a:t>4/16/2021</a:t>
             </a:fld>
             <a:endParaRPr lang="en-US"/>
           </a:p>
@@ -4415,7 +4415,7 @@
           <a:p>
             <a:fld id="{EECE8CBC-D9E8-4B9C-9658-364F4F7C96BD}" type="datetimeFigureOut">
               <a:rPr lang="en-US" smtClean="0"/>
-              <a:t>4/15/2021</a:t>
+              <a:t>4/16/2021</a:t>
             </a:fld>
             <a:endParaRPr lang="en-US"/>
           </a:p>
@@ -4510,7 +4510,7 @@
           <a:p>
             <a:fld id="{EECE8CBC-D9E8-4B9C-9658-364F4F7C96BD}" type="datetimeFigureOut">
               <a:rPr lang="en-US" smtClean="0"/>
-              <a:t>4/15/2021</a:t>
+              <a:t>4/16/2021</a:t>
             </a:fld>
             <a:endParaRPr lang="en-US"/>
           </a:p>
@@ -4765,7 +4765,7 @@
           <a:p>
             <a:fld id="{EECE8CBC-D9E8-4B9C-9658-364F4F7C96BD}" type="datetimeFigureOut">
               <a:rPr lang="en-US" smtClean="0"/>
-              <a:t>4/15/2021</a:t>
+              <a:t>4/16/2021</a:t>
             </a:fld>
             <a:endParaRPr lang="en-US"/>
           </a:p>
@@ -5048,7 +5048,7 @@
           <a:p>
             <a:fld id="{EECE8CBC-D9E8-4B9C-9658-364F4F7C96BD}" type="datetimeFigureOut">
               <a:rPr lang="en-US" smtClean="0"/>
-              <a:t>4/15/2021</a:t>
+              <a:t>4/16/2021</a:t>
             </a:fld>
             <a:endParaRPr lang="en-US"/>
           </a:p>
@@ -5454,7 +5454,7 @@
           <a:p>
             <a:fld id="{EECE8CBC-D9E8-4B9C-9658-364F4F7C96BD}" type="datetimeFigureOut">
               <a:rPr lang="en-US" smtClean="0"/>
-              <a:t>4/15/2021</a:t>
+              <a:t>4/16/2021</a:t>
             </a:fld>
             <a:endParaRPr lang="en-US"/>
           </a:p>
@@ -11364,6 +11364,18 @@
   <p:clrMapOvr>
     <a:masterClrMapping/>
   </p:clrMapOvr>
+  <mc:AlternateContent xmlns:mc="http://schemas.openxmlformats.org/markup-compatibility/2006">
+    <mc:Choice xmlns:p14="http://schemas.microsoft.com/office/powerpoint/2010/main" Requires="p14">
+      <p:transition spd="slow" p14:dur="1500">
+        <p:split orient="vert"/>
+      </p:transition>
+    </mc:Choice>
+    <mc:Fallback>
+      <p:transition spd="slow">
+        <p:split orient="vert"/>
+      </p:transition>
+    </mc:Fallback>
+  </mc:AlternateContent>
   <p:timing>
     <p:tnLst>
       <p:par>
@@ -12550,6 +12562,18 @@
   <p:clrMapOvr>
     <a:masterClrMapping/>
   </p:clrMapOvr>
+  <mc:AlternateContent xmlns:mc="http://schemas.openxmlformats.org/markup-compatibility/2006">
+    <mc:Choice xmlns:p14="http://schemas.microsoft.com/office/powerpoint/2010/main" Requires="p14">
+      <p:transition spd="slow" p14:dur="3400">
+        <p14:reveal/>
+      </p:transition>
+    </mc:Choice>
+    <mc:Fallback>
+      <p:transition spd="slow">
+        <p:fade/>
+      </p:transition>
+    </mc:Fallback>
+  </mc:AlternateContent>
   <p:timing>
     <p:tnLst>
       <p:par>
@@ -13095,12 +13119,20 @@
             <p:ph type="title"/>
           </p:nvPr>
         </p:nvSpPr>
-        <p:spPr/>
+        <p:spPr>
+          <a:xfrm>
+            <a:off x="684212" y="235843"/>
+            <a:ext cx="8534400" cy="1507067"/>
+          </a:xfrm>
+        </p:spPr>
         <p:txBody>
           <a:bodyPr/>
           <a:lstStyle/>
           <a:p>
-            <a:endParaRPr lang="en-GB"/>
+            <a:r>
+              <a:rPr lang="en-GB" dirty="0"/>
+              <a:t>ZADACI</a:t>
+            </a:r>
           </a:p>
         </p:txBody>
       </p:sp>
@@ -13120,12 +13152,222 @@
             <p:ph idx="1"/>
           </p:nvPr>
         </p:nvSpPr>
-        <p:spPr/>
+        <p:spPr>
+          <a:xfrm>
+            <a:off x="684212" y="1357460"/>
+            <a:ext cx="8534400" cy="5344998"/>
+          </a:xfrm>
+        </p:spPr>
         <p:txBody>
           <a:bodyPr/>
           <a:lstStyle/>
           <a:p>
-            <a:endParaRPr lang="en-GB"/>
+            <a:r>
+              <a:rPr lang="en-GB" dirty="0" err="1">
+                <a:solidFill>
+                  <a:schemeClr val="tx1"/>
+                </a:solidFill>
+              </a:rPr>
+              <a:t>Veli</a:t>
+            </a:r>
+            <a:r>
+              <a:rPr lang="bs-Latn-BA" dirty="0">
+                <a:solidFill>
+                  <a:schemeClr val="tx1"/>
+                </a:solidFill>
+              </a:rPr>
+              <a:t>ka Morava je dugačka 185km i nastaje od Južne Morave, koja je 90km duža, i Zapadne Morave, koja je 123km duža od nje. Kolika je ukupna dužina ove tri rijeke?</a:t>
+            </a:r>
+          </a:p>
+          <a:p>
+            <a:endParaRPr lang="bs-Latn-BA" dirty="0">
+              <a:solidFill>
+                <a:schemeClr val="tx1"/>
+              </a:solidFill>
+            </a:endParaRPr>
+          </a:p>
+          <a:p>
+            <a:r>
+              <a:rPr lang="bs-Latn-BA" dirty="0">
+                <a:solidFill>
+                  <a:schemeClr val="tx1"/>
+                </a:solidFill>
+              </a:rPr>
+              <a:t>velika_</a:t>
+            </a:r>
+            <a:r>
+              <a:rPr lang="en-GB" dirty="0" err="1">
+                <a:solidFill>
+                  <a:schemeClr val="tx1"/>
+                </a:solidFill>
+              </a:rPr>
+              <a:t>morava</a:t>
+            </a:r>
+            <a:r>
+              <a:rPr lang="en-GB" dirty="0">
+                <a:solidFill>
+                  <a:schemeClr val="tx1"/>
+                </a:solidFill>
+              </a:rPr>
+              <a:t> = 85</a:t>
+            </a:r>
+          </a:p>
+          <a:p>
+            <a:r>
+              <a:rPr lang="en-GB" dirty="0" err="1">
+                <a:solidFill>
+                  <a:schemeClr val="tx1"/>
+                </a:solidFill>
+              </a:rPr>
+              <a:t>juzna_morava</a:t>
+            </a:r>
+            <a:r>
+              <a:rPr lang="en-GB" dirty="0">
+                <a:solidFill>
+                  <a:schemeClr val="tx1"/>
+                </a:solidFill>
+              </a:rPr>
+              <a:t> = </a:t>
+            </a:r>
+            <a:r>
+              <a:rPr lang="en-GB" dirty="0" err="1">
+                <a:solidFill>
+                  <a:schemeClr val="tx1"/>
+                </a:solidFill>
+              </a:rPr>
+              <a:t>velika_morava</a:t>
+            </a:r>
+            <a:r>
+              <a:rPr lang="en-GB" dirty="0">
+                <a:solidFill>
+                  <a:schemeClr val="tx1"/>
+                </a:solidFill>
+              </a:rPr>
+              <a:t> + 90</a:t>
+            </a:r>
+          </a:p>
+          <a:p>
+            <a:r>
+              <a:rPr lang="en-GB" dirty="0" err="1">
+                <a:solidFill>
+                  <a:schemeClr val="tx1"/>
+                </a:solidFill>
+              </a:rPr>
+              <a:t>zapadna_morava</a:t>
+            </a:r>
+            <a:r>
+              <a:rPr lang="en-GB" dirty="0">
+                <a:solidFill>
+                  <a:schemeClr val="tx1"/>
+                </a:solidFill>
+              </a:rPr>
+              <a:t> = </a:t>
+            </a:r>
+            <a:r>
+              <a:rPr lang="en-GB" dirty="0" err="1">
+                <a:solidFill>
+                  <a:schemeClr val="tx1"/>
+                </a:solidFill>
+              </a:rPr>
+              <a:t>velika_morava</a:t>
+            </a:r>
+            <a:r>
+              <a:rPr lang="en-GB" dirty="0">
+                <a:solidFill>
+                  <a:schemeClr val="tx1"/>
+                </a:solidFill>
+              </a:rPr>
+              <a:t> + 123</a:t>
+            </a:r>
+          </a:p>
+          <a:p>
+            <a:r>
+              <a:rPr lang="en-GB" dirty="0" err="1">
+                <a:solidFill>
+                  <a:schemeClr val="tx1"/>
+                </a:solidFill>
+              </a:rPr>
+              <a:t>ukupno</a:t>
+            </a:r>
+            <a:r>
+              <a:rPr lang="en-GB" dirty="0">
+                <a:solidFill>
+                  <a:schemeClr val="tx1"/>
+                </a:solidFill>
+              </a:rPr>
+              <a:t> = </a:t>
+            </a:r>
+            <a:r>
+              <a:rPr lang="en-GB" dirty="0" err="1">
+                <a:solidFill>
+                  <a:schemeClr val="tx1"/>
+                </a:solidFill>
+              </a:rPr>
+              <a:t>vevelika_morava</a:t>
+            </a:r>
+            <a:r>
+              <a:rPr lang="en-GB" dirty="0">
+                <a:solidFill>
+                  <a:schemeClr val="tx1"/>
+                </a:solidFill>
+              </a:rPr>
+              <a:t> + </a:t>
+            </a:r>
+            <a:r>
+              <a:rPr lang="en-GB" dirty="0" err="1">
+                <a:solidFill>
+                  <a:schemeClr val="tx1"/>
+                </a:solidFill>
+              </a:rPr>
+              <a:t>juzna_morava</a:t>
+            </a:r>
+            <a:r>
+              <a:rPr lang="en-GB" dirty="0">
+                <a:solidFill>
+                  <a:schemeClr val="tx1"/>
+                </a:solidFill>
+              </a:rPr>
+              <a:t> + </a:t>
+            </a:r>
+            <a:r>
+              <a:rPr lang="en-GB" dirty="0" err="1">
+                <a:solidFill>
+                  <a:schemeClr val="tx1"/>
+                </a:solidFill>
+              </a:rPr>
+              <a:t>zapadna_morava</a:t>
+            </a:r>
+            <a:endParaRPr lang="en-GB" dirty="0">
+              <a:solidFill>
+                <a:schemeClr val="tx1"/>
+              </a:solidFill>
+            </a:endParaRPr>
+          </a:p>
+          <a:p>
+            <a:r>
+              <a:rPr lang="en-GB" dirty="0">
+                <a:solidFill>
+                  <a:schemeClr val="tx1"/>
+                </a:solidFill>
+              </a:rPr>
+              <a:t>print(</a:t>
+            </a:r>
+            <a:r>
+              <a:rPr lang="en-GB" dirty="0" err="1">
+                <a:solidFill>
+                  <a:schemeClr val="tx1"/>
+                </a:solidFill>
+              </a:rPr>
+              <a:t>ukupno</a:t>
+            </a:r>
+            <a:r>
+              <a:rPr lang="en-GB" dirty="0">
+                <a:solidFill>
+                  <a:schemeClr val="tx1"/>
+                </a:solidFill>
+              </a:rPr>
+              <a:t>)</a:t>
+            </a:r>
           </a:p>
         </p:txBody>
       </p:sp>
@@ -13139,6 +13381,408 @@
   <p:clrMapOvr>
     <a:masterClrMapping/>
   </p:clrMapOvr>
+  <p:transition spd="slow">
+    <p:randomBar dir="vert"/>
+  </p:transition>
+  <p:timing>
+    <p:tnLst>
+      <p:par>
+        <p:cTn id="1" dur="indefinite" restart="never" nodeType="tmRoot">
+          <p:childTnLst>
+            <p:seq concurrent="1" nextAc="seek">
+              <p:cTn id="2" dur="indefinite" nodeType="mainSeq">
+                <p:childTnLst>
+                  <p:par>
+                    <p:cTn id="3" fill="hold">
+                      <p:stCondLst>
+                        <p:cond delay="indefinite"/>
+                        <p:cond evt="onBegin" delay="0">
+                          <p:tn val="2"/>
+                        </p:cond>
+                      </p:stCondLst>
+                      <p:childTnLst>
+                        <p:par>
+                          <p:cTn id="4" fill="hold">
+                            <p:stCondLst>
+                              <p:cond delay="0"/>
+                            </p:stCondLst>
+                            <p:childTnLst>
+                              <p:par>
+                                <p:cTn id="5" presetID="16" presetClass="entr" presetSubtype="21" fill="hold" nodeType="afterEffect">
+                                  <p:stCondLst>
+                                    <p:cond delay="0"/>
+                                  </p:stCondLst>
+                                  <p:childTnLst>
+                                    <p:set>
+                                      <p:cBhvr>
+                                        <p:cTn id="6" dur="1" fill="hold">
+                                          <p:stCondLst>
+                                            <p:cond delay="0"/>
+                                          </p:stCondLst>
+                                        </p:cTn>
+                                        <p:tgtEl>
+                                          <p:spTgt spid="3">
+                                            <p:txEl>
+                                              <p:pRg st="0" end="0"/>
+                                            </p:txEl>
+                                          </p:spTgt>
+                                        </p:tgtEl>
+                                        <p:attrNameLst>
+                                          <p:attrName>style.visibility</p:attrName>
+                                        </p:attrNameLst>
+                                      </p:cBhvr>
+                                      <p:to>
+                                        <p:strVal val="visible"/>
+                                      </p:to>
+                                    </p:set>
+                                    <p:animEffect transition="in" filter="barn(inVertical)">
+                                      <p:cBhvr>
+                                        <p:cTn id="7" dur="500"/>
+                                        <p:tgtEl>
+                                          <p:spTgt spid="3">
+                                            <p:txEl>
+                                              <p:pRg st="0" end="0"/>
+                                            </p:txEl>
+                                          </p:spTgt>
+                                        </p:tgtEl>
+                                      </p:cBhvr>
+                                    </p:animEffect>
+                                  </p:childTnLst>
+                                </p:cTn>
+                              </p:par>
+                            </p:childTnLst>
+                          </p:cTn>
+                        </p:par>
+                      </p:childTnLst>
+                    </p:cTn>
+                  </p:par>
+                  <p:par>
+                    <p:cTn id="8" fill="hold">
+                      <p:stCondLst>
+                        <p:cond delay="indefinite"/>
+                      </p:stCondLst>
+                      <p:childTnLst>
+                        <p:par>
+                          <p:cTn id="9" fill="hold">
+                            <p:stCondLst>
+                              <p:cond delay="0"/>
+                            </p:stCondLst>
+                            <p:childTnLst>
+                              <p:par>
+                                <p:cTn id="10" presetID="16" presetClass="entr" presetSubtype="21" fill="hold" nodeType="clickEffect">
+                                  <p:stCondLst>
+                                    <p:cond delay="0"/>
+                                  </p:stCondLst>
+                                  <p:childTnLst>
+                                    <p:set>
+                                      <p:cBhvr>
+                                        <p:cTn id="11" dur="1" fill="hold">
+                                          <p:stCondLst>
+                                            <p:cond delay="0"/>
+                                          </p:stCondLst>
+                                        </p:cTn>
+                                        <p:tgtEl>
+                                          <p:spTgt spid="3">
+                                            <p:txEl>
+                                              <p:pRg st="2" end="2"/>
+                                            </p:txEl>
+                                          </p:spTgt>
+                                        </p:tgtEl>
+                                        <p:attrNameLst>
+                                          <p:attrName>style.visibility</p:attrName>
+                                        </p:attrNameLst>
+                                      </p:cBhvr>
+                                      <p:to>
+                                        <p:strVal val="visible"/>
+                                      </p:to>
+                                    </p:set>
+                                    <p:animEffect transition="in" filter="barn(inVertical)">
+                                      <p:cBhvr>
+                                        <p:cTn id="12" dur="500"/>
+                                        <p:tgtEl>
+                                          <p:spTgt spid="3">
+                                            <p:txEl>
+                                              <p:pRg st="2" end="2"/>
+                                            </p:txEl>
+                                          </p:spTgt>
+                                        </p:tgtEl>
+                                      </p:cBhvr>
+                                    </p:animEffect>
+                                  </p:childTnLst>
+                                </p:cTn>
+                              </p:par>
+                            </p:childTnLst>
+                          </p:cTn>
+                        </p:par>
+                      </p:childTnLst>
+                    </p:cTn>
+                  </p:par>
+                  <p:par>
+                    <p:cTn id="13" fill="hold">
+                      <p:stCondLst>
+                        <p:cond delay="indefinite"/>
+                      </p:stCondLst>
+                      <p:childTnLst>
+                        <p:par>
+                          <p:cTn id="14" fill="hold">
+                            <p:stCondLst>
+                              <p:cond delay="0"/>
+                            </p:stCondLst>
+                            <p:childTnLst>
+                              <p:par>
+                                <p:cTn id="15" presetID="16" presetClass="entr" presetSubtype="21" fill="hold" nodeType="clickEffect">
+                                  <p:stCondLst>
+                                    <p:cond delay="0"/>
+                                  </p:stCondLst>
+                                  <p:childTnLst>
+                                    <p:set>
+                                      <p:cBhvr>
+                                        <p:cTn id="16" dur="1" fill="hold">
+                                          <p:stCondLst>
+                                            <p:cond delay="0"/>
+                                          </p:stCondLst>
+                                        </p:cTn>
+                                        <p:tgtEl>
+                                          <p:spTgt spid="3">
+                                            <p:txEl>
+                                              <p:pRg st="3" end="3"/>
+                                            </p:txEl>
+                                          </p:spTgt>
+                                        </p:tgtEl>
+                                        <p:attrNameLst>
+                                          <p:attrName>style.visibility</p:attrName>
+                                        </p:attrNameLst>
+                                      </p:cBhvr>
+                                      <p:to>
+                                        <p:strVal val="visible"/>
+                                      </p:to>
+                                    </p:set>
+                                    <p:animEffect transition="in" filter="barn(inVertical)">
+                                      <p:cBhvr>
+                                        <p:cTn id="17" dur="500"/>
+                                        <p:tgtEl>
+                                          <p:spTgt spid="3">
+                                            <p:txEl>
+                                              <p:pRg st="3" end="3"/>
+                                            </p:txEl>
+                                          </p:spTgt>
+                                        </p:tgtEl>
+                                      </p:cBhvr>
+                                    </p:animEffect>
+                                  </p:childTnLst>
+                                </p:cTn>
+                              </p:par>
+                            </p:childTnLst>
+                          </p:cTn>
+                        </p:par>
+                      </p:childTnLst>
+                    </p:cTn>
+                  </p:par>
+                  <p:par>
+                    <p:cTn id="18" fill="hold">
+                      <p:stCondLst>
+                        <p:cond delay="indefinite"/>
+                      </p:stCondLst>
+                      <p:childTnLst>
+                        <p:par>
+                          <p:cTn id="19" fill="hold">
+                            <p:stCondLst>
+                              <p:cond delay="0"/>
+                            </p:stCondLst>
+                            <p:childTnLst>
+                              <p:par>
+                                <p:cTn id="20" presetID="16" presetClass="entr" presetSubtype="21" fill="hold" nodeType="clickEffect">
+                                  <p:stCondLst>
+                                    <p:cond delay="0"/>
+                                  </p:stCondLst>
+                                  <p:childTnLst>
+                                    <p:set>
+                                      <p:cBhvr>
+                                        <p:cTn id="21" dur="1" fill="hold">
+                                          <p:stCondLst>
+                                            <p:cond delay="0"/>
+                                          </p:stCondLst>
+                                        </p:cTn>
+                                        <p:tgtEl>
+                                          <p:spTgt spid="3">
+                                            <p:txEl>
+                                              <p:pRg st="4" end="4"/>
+                                            </p:txEl>
+                                          </p:spTgt>
+                                        </p:tgtEl>
+                                        <p:attrNameLst>
+                                          <p:attrName>style.visibility</p:attrName>
+                                        </p:attrNameLst>
+                                      </p:cBhvr>
+                                      <p:to>
+                                        <p:strVal val="visible"/>
+                                      </p:to>
+                                    </p:set>
+                                    <p:animEffect transition="in" filter="barn(inVertical)">
+                                      <p:cBhvr>
+                                        <p:cTn id="22" dur="500"/>
+                                        <p:tgtEl>
+                                          <p:spTgt spid="3">
+                                            <p:txEl>
+                                              <p:pRg st="4" end="4"/>
+                                            </p:txEl>
+                                          </p:spTgt>
+                                        </p:tgtEl>
+                                      </p:cBhvr>
+                                    </p:animEffect>
+                                  </p:childTnLst>
+                                </p:cTn>
+                              </p:par>
+                            </p:childTnLst>
+                          </p:cTn>
+                        </p:par>
+                      </p:childTnLst>
+                    </p:cTn>
+                  </p:par>
+                  <p:par>
+                    <p:cTn id="23" fill="hold">
+                      <p:stCondLst>
+                        <p:cond delay="indefinite"/>
+                      </p:stCondLst>
+                      <p:childTnLst>
+                        <p:par>
+                          <p:cTn id="24" fill="hold">
+                            <p:stCondLst>
+                              <p:cond delay="0"/>
+                            </p:stCondLst>
+                            <p:childTnLst>
+                              <p:par>
+                                <p:cTn id="25" presetID="16" presetClass="entr" presetSubtype="21" fill="hold" nodeType="clickEffect">
+                                  <p:stCondLst>
+                                    <p:cond delay="0"/>
+                                  </p:stCondLst>
+                                  <p:childTnLst>
+                                    <p:set>
+                                      <p:cBhvr>
+                                        <p:cTn id="26" dur="1" fill="hold">
+                                          <p:stCondLst>
+                                            <p:cond delay="0"/>
+                                          </p:stCondLst>
+                                        </p:cTn>
+                                        <p:tgtEl>
+                                          <p:spTgt spid="3">
+                                            <p:txEl>
+                                              <p:pRg st="5" end="5"/>
+                                            </p:txEl>
+                                          </p:spTgt>
+                                        </p:tgtEl>
+                                        <p:attrNameLst>
+                                          <p:attrName>style.visibility</p:attrName>
+                                        </p:attrNameLst>
+                                      </p:cBhvr>
+                                      <p:to>
+                                        <p:strVal val="visible"/>
+                                      </p:to>
+                                    </p:set>
+                                    <p:animEffect transition="in" filter="barn(inVertical)">
+                                      <p:cBhvr>
+                                        <p:cTn id="27" dur="500"/>
+                                        <p:tgtEl>
+                                          <p:spTgt spid="3">
+                                            <p:txEl>
+                                              <p:pRg st="5" end="5"/>
+                                            </p:txEl>
+                                          </p:spTgt>
+                                        </p:tgtEl>
+                                      </p:cBhvr>
+                                    </p:animEffect>
+                                  </p:childTnLst>
+                                </p:cTn>
+                              </p:par>
+                            </p:childTnLst>
+                          </p:cTn>
+                        </p:par>
+                      </p:childTnLst>
+                    </p:cTn>
+                  </p:par>
+                  <p:par>
+                    <p:cTn id="28" fill="hold">
+                      <p:stCondLst>
+                        <p:cond delay="indefinite"/>
+                      </p:stCondLst>
+                      <p:childTnLst>
+                        <p:par>
+                          <p:cTn id="29" fill="hold">
+                            <p:stCondLst>
+                              <p:cond delay="0"/>
+                            </p:stCondLst>
+                            <p:childTnLst>
+                              <p:par>
+                                <p:cTn id="30" presetID="16" presetClass="entr" presetSubtype="21" fill="hold" nodeType="clickEffect">
+                                  <p:stCondLst>
+                                    <p:cond delay="0"/>
+                                  </p:stCondLst>
+                                  <p:childTnLst>
+                                    <p:set>
+                                      <p:cBhvr>
+                                        <p:cTn id="31" dur="1" fill="hold">
+                                          <p:stCondLst>
+                                            <p:cond delay="0"/>
+                                          </p:stCondLst>
+                                        </p:cTn>
+                                        <p:tgtEl>
+                                          <p:spTgt spid="3">
+                                            <p:txEl>
+                                              <p:pRg st="6" end="6"/>
+                                            </p:txEl>
+                                          </p:spTgt>
+                                        </p:tgtEl>
+                                        <p:attrNameLst>
+                                          <p:attrName>style.visibility</p:attrName>
+                                        </p:attrNameLst>
+                                      </p:cBhvr>
+                                      <p:to>
+                                        <p:strVal val="visible"/>
+                                      </p:to>
+                                    </p:set>
+                                    <p:animEffect transition="in" filter="barn(inVertical)">
+                                      <p:cBhvr>
+                                        <p:cTn id="32" dur="500"/>
+                                        <p:tgtEl>
+                                          <p:spTgt spid="3">
+                                            <p:txEl>
+                                              <p:pRg st="6" end="6"/>
+                                            </p:txEl>
+                                          </p:spTgt>
+                                        </p:tgtEl>
+                                      </p:cBhvr>
+                                    </p:animEffect>
+                                  </p:childTnLst>
+                                </p:cTn>
+                              </p:par>
+                            </p:childTnLst>
+                          </p:cTn>
+                        </p:par>
+                      </p:childTnLst>
+                    </p:cTn>
+                  </p:par>
+                </p:childTnLst>
+              </p:cTn>
+              <p:prevCondLst>
+                <p:cond evt="onPrev" delay="0">
+                  <p:tgtEl>
+                    <p:sldTgt/>
+                  </p:tgtEl>
+                </p:cond>
+              </p:prevCondLst>
+              <p:nextCondLst>
+                <p:cond evt="onNext" delay="0">
+                  <p:tgtEl>
+                    <p:sldTgt/>
+                  </p:tgtEl>
+                </p:cond>
+              </p:nextCondLst>
+            </p:seq>
+          </p:childTnLst>
+        </p:cTn>
+      </p:par>
+    </p:tnLst>
+  </p:timing>
 </p:sld>
 </file>
 

</xml_diff>